<commit_message>
remove discoMore name and prepare formation montpellier
</commit_message>
<xml_diff>
--- a/donot_release/formation_montpellier/TP_formation_colib'read.pptx
+++ b/donot_release/formation_montpellier/TP_formation_colib'read.pptx
@@ -3752,7 +3752,7 @@
       </p:sp>
       <p:pic>
         <p:nvPicPr>
-          <p:cNvPr id="5" name="Image 4" descr="roc_human_c.png"/>
+          <p:cNvPr id="6" name="Image 5" descr="roc_human_c.png"/>
           <p:cNvPicPr>
             <a:picLocks noChangeAspect="1"/>
           </p:cNvPicPr>
@@ -3772,7 +3772,7 @@
         </p:blipFill>
         <p:spPr>
           <a:xfrm>
-            <a:off x="1726359" y="381552"/>
+            <a:off x="1828800" y="533400"/>
             <a:ext cx="7315200" cy="5943600"/>
           </a:xfrm>
           <a:prstGeom prst="rect">
@@ -3835,7 +3835,7 @@
       </p:sp>
       <p:pic>
         <p:nvPicPr>
-          <p:cNvPr id="5" name="Image 4" descr="roc_human_k.png"/>
+          <p:cNvPr id="6" name="Image 5" descr="roc_human_k.png"/>
           <p:cNvPicPr>
             <a:picLocks noChangeAspect="1"/>
           </p:cNvPicPr>
@@ -3855,7 +3855,7 @@
         </p:blipFill>
         <p:spPr>
           <a:xfrm>
-            <a:off x="1531400" y="533400"/>
+            <a:off x="1769518" y="619659"/>
             <a:ext cx="7315200" cy="5943600"/>
           </a:xfrm>
           <a:prstGeom prst="rect">

</xml_diff>